<commit_message>
add function to change font size based on number of lines and misc changes
-- Add slLib \ fSize(numLines, maxFsize=20)
reduces the font size from 20 to 10 pt as the number of rows increase from
<12 to >25.

-- Add slDeck_multi \ textSlide to create slides with just multiple lines
of text

--reduced pptx template icon on lower right corner of title slide. It interfered with long subtitle names.
</commit_message>
<xml_diff>
--- a/shTemplate.pptx
+++ b/shTemplate.pptx
@@ -266,7 +266,7 @@
           <a:p>
             <a:fld id="{C764DE79-268F-4C1A-8933-263129D2AF90}" type="datetimeFigureOut">
               <a:rPr lang="en-US" dirty="0"/>
-              <a:t>9/29/2017</a:t>
+              <a:t>10/18/2017</a:t>
             </a:fld>
             <a:endParaRPr lang="en-US" dirty="0"/>
           </a:p>
@@ -460,7 +460,7 @@
           <a:p>
             <a:fld id="{C764DE79-268F-4C1A-8933-263129D2AF90}" type="datetimeFigureOut">
               <a:rPr lang="en-US" dirty="0"/>
-              <a:t>9/29/2017</a:t>
+              <a:t>10/18/2017</a:t>
             </a:fld>
             <a:endParaRPr lang="en-US" dirty="0"/>
           </a:p>
@@ -664,7 +664,7 @@
           <a:p>
             <a:fld id="{C764DE79-268F-4C1A-8933-263129D2AF90}" type="datetimeFigureOut">
               <a:rPr lang="en-US" dirty="0"/>
-              <a:t>9/29/2017</a:t>
+              <a:t>10/18/2017</a:t>
             </a:fld>
             <a:endParaRPr lang="en-US" dirty="0"/>
           </a:p>
@@ -1179,7 +1179,7 @@
           <a:p>
             <a:fld id="{C764DE79-268F-4C1A-8933-263129D2AF90}" type="datetimeFigureOut">
               <a:rPr lang="en-US" dirty="0"/>
-              <a:t>9/29/2017</a:t>
+              <a:t>10/18/2017</a:t>
             </a:fld>
             <a:endParaRPr lang="en-US" dirty="0"/>
           </a:p>
@@ -1435,7 +1435,7 @@
           <a:p>
             <a:fld id="{C764DE79-268F-4C1A-8933-263129D2AF90}" type="datetimeFigureOut">
               <a:rPr lang="en-US" dirty="0"/>
-              <a:t>9/29/2017</a:t>
+              <a:t>10/18/2017</a:t>
             </a:fld>
             <a:endParaRPr lang="en-US" dirty="0"/>
           </a:p>
@@ -1826,7 +1826,7 @@
           <a:p>
             <a:fld id="{C764DE79-268F-4C1A-8933-263129D2AF90}" type="datetimeFigureOut">
               <a:rPr lang="en-US" dirty="0"/>
-              <a:t>9/29/2017</a:t>
+              <a:t>10/18/2017</a:t>
             </a:fld>
             <a:endParaRPr lang="en-US" dirty="0"/>
           </a:p>
@@ -1968,7 +1968,7 @@
           <a:p>
             <a:fld id="{C764DE79-268F-4C1A-8933-263129D2AF90}" type="datetimeFigureOut">
               <a:rPr lang="en-US" dirty="0"/>
-              <a:t>9/29/2017</a:t>
+              <a:t>10/18/2017</a:t>
             </a:fld>
             <a:endParaRPr lang="en-US" dirty="0"/>
           </a:p>
@@ -2087,7 +2087,7 @@
           <a:p>
             <a:fld id="{C764DE79-268F-4C1A-8933-263129D2AF90}" type="datetimeFigureOut">
               <a:rPr lang="en-US" dirty="0"/>
-              <a:t>9/29/2017</a:t>
+              <a:t>10/18/2017</a:t>
             </a:fld>
             <a:endParaRPr lang="en-US" dirty="0"/>
           </a:p>
@@ -2388,7 +2388,7 @@
           <a:p>
             <a:fld id="{C764DE79-268F-4C1A-8933-263129D2AF90}" type="datetimeFigureOut">
               <a:rPr lang="en-US" dirty="0"/>
-              <a:t>9/29/2017</a:t>
+              <a:t>10/18/2017</a:t>
             </a:fld>
             <a:endParaRPr lang="en-US" dirty="0"/>
           </a:p>
@@ -2669,7 +2669,7 @@
           <a:p>
             <a:fld id="{C764DE79-268F-4C1A-8933-263129D2AF90}" type="datetimeFigureOut">
               <a:rPr lang="en-US" dirty="0"/>
-              <a:t>9/29/2017</a:t>
+              <a:t>10/18/2017</a:t>
             </a:fld>
             <a:endParaRPr lang="en-US" dirty="0"/>
           </a:p>
@@ -2902,7 +2902,7 @@
                 <a:ea typeface="+mn-ea"/>
                 <a:cs typeface="+mn-cs"/>
               </a:rPr>
-              <a:t>9/29/2017</a:t>
+              <a:t>10/18/2017</a:t>
             </a:fld>
             <a:endParaRPr lang="en-US" sz="900" kern="1200" dirty="0">
               <a:solidFill>
@@ -3356,7 +3356,7 @@
         </p:nvSpPr>
         <p:spPr>
           <a:xfrm>
-            <a:off x="-228600" y="0"/>
+            <a:off x="0" y="0"/>
             <a:ext cx="12192000" cy="6858000"/>
           </a:xfrm>
           <a:prstGeom prst="rect">
@@ -9018,8 +9018,8 @@
         </p:nvGrpSpPr>
         <p:grpSpPr>
           <a:xfrm>
-            <a:off x="9036304" y="2971800"/>
-            <a:ext cx="2503877" cy="2855833"/>
+            <a:off x="10466562" y="4667883"/>
+            <a:ext cx="1365463" cy="1560433"/>
             <a:chOff x="8335963" y="5859463"/>
             <a:chExt cx="1554162" cy="1574800"/>
           </a:xfrm>
@@ -10521,7 +10521,7 @@
             <a:effectLst/>
             <a:extLst>
               <a:ext uri="{91240B29-F687-4f45-9708-019B960494DF}">
-                <a14:hiddenLine xmlns="" xmlns:a14="http://schemas.microsoft.com/office/drawing/2010/main" w="9525" cap="flat">
+                <a14:hiddenLine xmlns:a14="http://schemas.microsoft.com/office/drawing/2010/main" xmlns="" w="9525" cap="flat">
                   <a:solidFill>
                     <a:srgbClr val="808080"/>
                   </a:solidFill>
@@ -10531,7 +10531,7 @@
                 </a14:hiddenLine>
               </a:ext>
               <a:ext uri="{AF507438-7753-43e0-B8FC-AC1667EBCBE1}">
-                <a14:hiddenEffects xmlns="" xmlns:a14="http://schemas.microsoft.com/office/drawing/2010/main">
+                <a14:hiddenEffects xmlns:a14="http://schemas.microsoft.com/office/drawing/2010/main" xmlns="">
                   <a:effectLst>
                     <a:outerShdw blurRad="63500" dist="38099" dir="2700000" algn="ctr" rotWithShape="0">
                       <a:srgbClr val="000000">
@@ -11272,7 +11272,7 @@
             <a:effectLst/>
             <a:extLst>
               <a:ext uri="{91240B29-F687-4f45-9708-019B960494DF}">
-                <a14:hiddenLine xmlns="" xmlns:a14="http://schemas.microsoft.com/office/drawing/2010/main" w="9525" cap="flat">
+                <a14:hiddenLine xmlns:a14="http://schemas.microsoft.com/office/drawing/2010/main" xmlns="" w="9525" cap="flat">
                   <a:solidFill>
                     <a:srgbClr val="808080"/>
                   </a:solidFill>
@@ -11282,7 +11282,7 @@
                 </a14:hiddenLine>
               </a:ext>
               <a:ext uri="{AF507438-7753-43e0-B8FC-AC1667EBCBE1}">
-                <a14:hiddenEffects xmlns="" xmlns:a14="http://schemas.microsoft.com/office/drawing/2010/main">
+                <a14:hiddenEffects xmlns:a14="http://schemas.microsoft.com/office/drawing/2010/main" xmlns="">
                   <a:effectLst>
                     <a:outerShdw blurRad="63500" dist="38099" dir="2700000" algn="ctr" rotWithShape="0">
                       <a:srgbClr val="000000">
@@ -12302,7 +12302,7 @@
             <a:effectLst/>
             <a:extLst>
               <a:ext uri="{91240B29-F687-4f45-9708-019B960494DF}">
-                <a14:hiddenLine xmlns="" xmlns:a14="http://schemas.microsoft.com/office/drawing/2010/main" w="9525" cap="flat">
+                <a14:hiddenLine xmlns:a14="http://schemas.microsoft.com/office/drawing/2010/main" xmlns="" w="9525" cap="flat">
                   <a:solidFill>
                     <a:srgbClr val="808080"/>
                   </a:solidFill>
@@ -12312,7 +12312,7 @@
                 </a14:hiddenLine>
               </a:ext>
               <a:ext uri="{AF507438-7753-43e0-B8FC-AC1667EBCBE1}">
-                <a14:hiddenEffects xmlns="" xmlns:a14="http://schemas.microsoft.com/office/drawing/2010/main">
+                <a14:hiddenEffects xmlns:a14="http://schemas.microsoft.com/office/drawing/2010/main" xmlns="">
                   <a:effectLst>
                     <a:outerShdw blurRad="63500" dist="38099" dir="2700000" algn="ctr" rotWithShape="0">
                       <a:srgbClr val="000000">
@@ -14073,7 +14073,7 @@
             <a:effectLst/>
             <a:extLst>
               <a:ext uri="{91240B29-F687-4f45-9708-019B960494DF}">
-                <a14:hiddenLine xmlns="" xmlns:a14="http://schemas.microsoft.com/office/drawing/2010/main" w="9525" cap="flat">
+                <a14:hiddenLine xmlns:a14="http://schemas.microsoft.com/office/drawing/2010/main" xmlns="" w="9525" cap="flat">
                   <a:solidFill>
                     <a:srgbClr val="808080"/>
                   </a:solidFill>
@@ -14083,7 +14083,7 @@
                 </a14:hiddenLine>
               </a:ext>
               <a:ext uri="{AF507438-7753-43e0-B8FC-AC1667EBCBE1}">
-                <a14:hiddenEffects xmlns="" xmlns:a14="http://schemas.microsoft.com/office/drawing/2010/main">
+                <a14:hiddenEffects xmlns:a14="http://schemas.microsoft.com/office/drawing/2010/main" xmlns="">
                   <a:effectLst>
                     <a:outerShdw blurRad="63500" dist="38099" dir="2700000" algn="ctr" rotWithShape="0">
                       <a:srgbClr val="000000">
@@ -14662,7 +14662,7 @@
             <a:effectLst/>
             <a:extLst>
               <a:ext uri="{91240B29-F687-4f45-9708-019B960494DF}">
-                <a14:hiddenLine xmlns="" xmlns:a14="http://schemas.microsoft.com/office/drawing/2010/main" w="9525" cap="flat">
+                <a14:hiddenLine xmlns:a14="http://schemas.microsoft.com/office/drawing/2010/main" xmlns="" w="9525" cap="flat">
                   <a:solidFill>
                     <a:srgbClr val="808080"/>
                   </a:solidFill>
@@ -14672,7 +14672,7 @@
                 </a14:hiddenLine>
               </a:ext>
               <a:ext uri="{AF507438-7753-43e0-B8FC-AC1667EBCBE1}">
-                <a14:hiddenEffects xmlns="" xmlns:a14="http://schemas.microsoft.com/office/drawing/2010/main">
+                <a14:hiddenEffects xmlns:a14="http://schemas.microsoft.com/office/drawing/2010/main" xmlns="">
                   <a:effectLst>
                     <a:outerShdw blurRad="63500" dist="38099" dir="2700000" algn="ctr" rotWithShape="0">
                       <a:srgbClr val="000000">

</xml_diff>